<commit_message>
Capture of topics for Tim & Ravi to discuss More content for PowerPoint, but still far from complete
--HG--
branch : LVTNet
</commit_message>
<xml_diff>
--- a/Documentation/LVTM_NIWeek_2017.pptx
+++ b/Documentation/LVTM_NIWeek_2017.pptx
@@ -253,7 +253,7 @@
           <a:p>
             <a:fld id="{41DBDD7F-39F0-994B-B822-183990148EFC}" type="datetimeFigureOut">
               <a:rPr lang="en-US" smtClean="0"/>
-              <a:t>14-Apr-2017</a:t>
+              <a:t>4/16/2017</a:t>
             </a:fld>
             <a:endParaRPr lang="en-US"/>
           </a:p>
@@ -1115,7 +1115,7 @@
           <a:p>
             <a:fld id="{0D24C6CA-46A1-5B48-B1AE-7D6F4B7A3418}" type="slidenum">
               <a:rPr lang="en-US" smtClean="0"/>
-              <a:t>21</a:t>
+              <a:t>8</a:t>
             </a:fld>
             <a:endParaRPr lang="en-US"/>
           </a:p>
@@ -1124,7 +1124,7 @@
     </p:spTree>
     <p:extLst>
       <p:ext uri="{BB962C8B-B14F-4D97-AF65-F5344CB8AC3E}">
-        <p14:creationId xmlns:p14="http://schemas.microsoft.com/office/powerpoint/2010/main" val="3951926544"/>
+        <p14:creationId xmlns:p14="http://schemas.microsoft.com/office/powerpoint/2010/main" val="3466565700"/>
       </p:ext>
     </p:extLst>
   </p:cSld>
@@ -1178,6 +1178,90 @@
           <a:bodyPr/>
           <a:lstStyle/>
           <a:p>
+            <a:endParaRPr lang="en-US" dirty="0"/>
+          </a:p>
+        </p:txBody>
+      </p:sp>
+      <p:sp>
+        <p:nvSpPr>
+          <p:cNvPr id="4" name="Slide Number Placeholder 3"/>
+          <p:cNvSpPr>
+            <a:spLocks noGrp="1"/>
+          </p:cNvSpPr>
+          <p:nvPr>
+            <p:ph type="sldNum" sz="quarter" idx="10"/>
+          </p:nvPr>
+        </p:nvSpPr>
+        <p:spPr/>
+        <p:txBody>
+          <a:bodyPr/>
+          <a:lstStyle/>
+          <a:p>
+            <a:fld id="{0D24C6CA-46A1-5B48-B1AE-7D6F4B7A3418}" type="slidenum">
+              <a:rPr lang="en-US" smtClean="0"/>
+              <a:t>21</a:t>
+            </a:fld>
+            <a:endParaRPr lang="en-US"/>
+          </a:p>
+        </p:txBody>
+      </p:sp>
+    </p:spTree>
+    <p:extLst>
+      <p:ext uri="{BB962C8B-B14F-4D97-AF65-F5344CB8AC3E}">
+        <p14:creationId xmlns:p14="http://schemas.microsoft.com/office/powerpoint/2010/main" val="3951926544"/>
+      </p:ext>
+    </p:extLst>
+  </p:cSld>
+  <p:clrMapOvr>
+    <a:masterClrMapping/>
+  </p:clrMapOvr>
+</p:notes>
+</file>
+
+<file path=ppt/notesSlides/notesSlide8.xml><?xml version="1.0" encoding="utf-8"?>
+<p:notes xmlns:a="http://schemas.openxmlformats.org/drawingml/2006/main" xmlns:r="http://schemas.openxmlformats.org/officeDocument/2006/relationships" xmlns:p="http://schemas.openxmlformats.org/presentationml/2006/main">
+  <p:cSld>
+    <p:spTree>
+      <p:nvGrpSpPr>
+        <p:cNvPr id="1" name=""/>
+        <p:cNvGrpSpPr/>
+        <p:nvPr/>
+      </p:nvGrpSpPr>
+      <p:grpSpPr>
+        <a:xfrm>
+          <a:off x="0" y="0"/>
+          <a:ext cx="0" cy="0"/>
+          <a:chOff x="0" y="0"/>
+          <a:chExt cx="0" cy="0"/>
+        </a:xfrm>
+      </p:grpSpPr>
+      <p:sp>
+        <p:nvSpPr>
+          <p:cNvPr id="2" name="Slide Image Placeholder 1"/>
+          <p:cNvSpPr>
+            <a:spLocks noGrp="1" noRot="1" noChangeAspect="1"/>
+          </p:cNvSpPr>
+          <p:nvPr>
+            <p:ph type="sldImg"/>
+          </p:nvPr>
+        </p:nvSpPr>
+        <p:spPr/>
+      </p:sp>
+      <p:sp>
+        <p:nvSpPr>
+          <p:cNvPr id="3" name="Notes Placeholder 2"/>
+          <p:cNvSpPr>
+            <a:spLocks noGrp="1"/>
+          </p:cNvSpPr>
+          <p:nvPr>
+            <p:ph type="body" idx="1"/>
+          </p:nvPr>
+        </p:nvSpPr>
+        <p:spPr/>
+        <p:txBody>
+          <a:bodyPr/>
+          <a:lstStyle/>
+          <a:p>
             <a:r>
               <a:rPr lang="en-US" dirty="0"/>
               <a:t>We want your</a:t>
@@ -1226,7 +1310,7 @@
 </p:notes>
 </file>
 
-<file path=ppt/notesSlides/notesSlide8.xml><?xml version="1.0" encoding="utf-8"?>
+<file path=ppt/notesSlides/notesSlide9.xml><?xml version="1.0" encoding="utf-8"?>
 <p:notes xmlns:a="http://schemas.openxmlformats.org/drawingml/2006/main" xmlns:r="http://schemas.openxmlformats.org/officeDocument/2006/relationships" xmlns:p="http://schemas.openxmlformats.org/presentationml/2006/main">
   <p:cSld>
     <p:spTree>
@@ -16601,18 +16685,13 @@
               <a:t>or just plain </a:t>
             </a:r>
             <a:r>
-              <a:rPr lang="en-US" dirty="0" err="1" smtClean="0"/>
+              <a:rPr lang="en-US" dirty="0" err="1"/>
               <a:t>ol</a:t>
             </a:r>
             <a:r>
-              <a:rPr lang="en-US" dirty="0" smtClean="0"/>
-              <a:t>’ </a:t>
-            </a:r>
-            <a:r>
-              <a:rPr lang="en-US" dirty="0"/>
-              <a:t>“never-knew-about-that”</a:t>
-            </a:r>
-            <a:endParaRPr lang="en-US" dirty="0"/>
+              <a:rPr lang="en-US" dirty="0"/>
+              <a:t>’ “never-knew-about-that”</a:t>
+            </a:r>
           </a:p>
         </p:txBody>
       </p:sp>
@@ -16637,48 +16716,28 @@
           <a:lstStyle/>
           <a:p>
             <a:r>
-              <a:rPr lang="en-US" sz="3200" dirty="0" smtClean="0"/>
-              <a:t>Suspend </a:t>
-            </a:r>
-            <a:r>
               <a:rPr lang="en-US" sz="3200" dirty="0"/>
-              <a:t>When </a:t>
-            </a:r>
-            <a:r>
-              <a:rPr lang="en-US" sz="3200" dirty="0" smtClean="0"/>
-              <a:t>Called</a:t>
+              <a:t>Suspend When Called</a:t>
             </a:r>
           </a:p>
           <a:p>
             <a:pPr lvl="1"/>
             <a:r>
-              <a:rPr lang="en-US" sz="2800" dirty="0" smtClean="0"/>
+              <a:rPr lang="en-US" sz="2800" dirty="0"/>
               <a:t>Access this from “SubVI Node Setup”</a:t>
             </a:r>
           </a:p>
           <a:p>
             <a:pPr lvl="1"/>
             <a:r>
-              <a:rPr lang="en-US" sz="2800" dirty="0" smtClean="0"/>
+              <a:rPr lang="en-US" sz="2800" dirty="0"/>
               <a:t>Video Demo: </a:t>
-            </a:r>
-            <a:r>
-              <a:rPr lang="en-US" sz="2800" dirty="0" smtClean="0">
-                <a:hlinkClick r:id="rId2"/>
-              </a:rPr>
-              <a:t>https</a:t>
             </a:r>
             <a:r>
               <a:rPr lang="en-US" sz="2800" dirty="0">
                 <a:hlinkClick r:id="rId2"/>
               </a:rPr>
-              <a:t>://</a:t>
-            </a:r>
-            <a:r>
-              <a:rPr lang="en-US" sz="2800" dirty="0" smtClean="0">
-                <a:hlinkClick r:id="rId2"/>
-              </a:rPr>
-              <a:t>youtu.be/AgXcyf2Ta_A</a:t>
+              <a:t>https://youtu.be/AgXcyf2Ta_A</a:t>
             </a:r>
             <a:endParaRPr lang="en-US" sz="2800" dirty="0"/>
           </a:p>
@@ -16743,25 +16802,24 @@
           <a:p>
             <a:pPr algn="ctr"/>
             <a:r>
-              <a:rPr lang="en-US" dirty="0" smtClean="0"/>
+              <a:rPr lang="en-US" dirty="0"/>
               <a:t>Often forgotten, overlooked, </a:t>
             </a:r>
             <a:br>
-              <a:rPr lang="en-US" dirty="0" smtClean="0"/>
+              <a:rPr lang="en-US" dirty="0"/>
             </a:br>
             <a:r>
-              <a:rPr lang="en-US" dirty="0" smtClean="0"/>
+              <a:rPr lang="en-US" dirty="0"/>
               <a:t>or just plain </a:t>
             </a:r>
             <a:r>
-              <a:rPr lang="en-US" dirty="0" err="1" smtClean="0"/>
+              <a:rPr lang="en-US" dirty="0" err="1"/>
               <a:t>ol</a:t>
             </a:r>
             <a:r>
-              <a:rPr lang="en-US" dirty="0" smtClean="0"/>
+              <a:rPr lang="en-US" dirty="0"/>
               <a:t>’ “never-knew-about-that”</a:t>
             </a:r>
-            <a:endParaRPr lang="en-US" dirty="0"/>
           </a:p>
         </p:txBody>
       </p:sp>
@@ -16786,7 +16844,7 @@
           <a:lstStyle/>
           <a:p>
             <a:r>
-              <a:rPr lang="en-US" sz="3200" dirty="0" err="1" smtClean="0"/>
+              <a:rPr lang="en-US" sz="3200" dirty="0" err="1"/>
               <a:t>WinDebugLogging</a:t>
             </a:r>
             <a:endParaRPr lang="en-US" sz="3200" dirty="0"/>
@@ -16799,13 +16857,8 @@
             </a:r>
             <a:r>
               <a:rPr lang="en-US" sz="2800" dirty="0"/>
-              <a:t> (from Sysinternals [Microsoft</a:t>
-            </a:r>
-            <a:r>
-              <a:rPr lang="en-US" sz="2800" dirty="0" smtClean="0"/>
-              <a:t>])</a:t>
-            </a:r>
-            <a:endParaRPr lang="en-US" sz="2800" dirty="0"/>
+              <a:t> (from Sysinternals [Microsoft])</a:t>
+            </a:r>
           </a:p>
         </p:txBody>
       </p:sp>
@@ -17720,21 +17773,8 @@
           <a:p>
             <a:r>
               <a:rPr lang="en-US" dirty="0"/>
-              <a:t>We must avoid </a:t>
-            </a:r>
-            <a:r>
-              <a:rPr lang="en-US" dirty="0" smtClean="0"/>
-              <a:t>“drawing </a:t>
-            </a:r>
-            <a:r>
-              <a:rPr lang="en-US" dirty="0"/>
-              <a:t>vast conclusions from half-vast </a:t>
-            </a:r>
-            <a:r>
-              <a:rPr lang="en-US" dirty="0" smtClean="0"/>
-              <a:t>data”</a:t>
-            </a:r>
-            <a:endParaRPr lang="en-US" dirty="0"/>
+              <a:t>We must avoid “drawing vast conclusions from half-vast data”</a:t>
+            </a:r>
           </a:p>
         </p:txBody>
       </p:sp>
@@ -17754,12 +17794,8 @@
           <a:lstStyle/>
           <a:p>
             <a:r>
-              <a:rPr lang="en-US" dirty="0" smtClean="0"/>
-              <a:t>—  </a:t>
-            </a:r>
-            <a:r>
-              <a:rPr lang="en-US" dirty="0"/>
-              <a:t>Jerry R. </a:t>
+              <a:rPr lang="en-US" dirty="0"/>
+              <a:t>—  Jerry R. </a:t>
             </a:r>
             <a:r>
               <a:rPr lang="en-US" dirty="0" err="1"/>
@@ -17885,10 +17921,9 @@
           <a:lstStyle/>
           <a:p>
             <a:r>
-              <a:rPr lang="en-US" dirty="0" smtClean="0"/>
+              <a:rPr lang="en-US" dirty="0"/>
               <a:t>LabVIEW Task Manager</a:t>
             </a:r>
-            <a:endParaRPr lang="en-US" dirty="0"/>
           </a:p>
         </p:txBody>
       </p:sp>
@@ -18530,10 +18565,9 @@
           <a:lstStyle/>
           <a:p>
             <a:r>
-              <a:rPr lang="en-US" dirty="0" smtClean="0"/>
+              <a:rPr lang="en-US" dirty="0"/>
               <a:t>Tim Vargo</a:t>
             </a:r>
-            <a:endParaRPr lang="en-US" dirty="0"/>
           </a:p>
         </p:txBody>
       </p:sp>
@@ -18558,10 +18592,9 @@
           <a:lstStyle/>
           <a:p>
             <a:r>
-              <a:rPr lang="en-US" dirty="0" smtClean="0"/>
+              <a:rPr lang="en-US" dirty="0"/>
               <a:t>Sandia National Laboratories</a:t>
             </a:r>
-            <a:endParaRPr lang="en-US" dirty="0"/>
           </a:p>
         </p:txBody>
       </p:sp>
@@ -18586,16 +18619,15 @@
           <a:lstStyle/>
           <a:p>
             <a:r>
-              <a:rPr lang="en-US" dirty="0" smtClean="0"/>
+              <a:rPr lang="en-US" dirty="0"/>
               <a:t>Instrumentation Engineer</a:t>
             </a:r>
           </a:p>
           <a:p>
             <a:r>
-              <a:rPr lang="en-US" dirty="0" smtClean="0"/>
+              <a:rPr lang="en-US" dirty="0"/>
               <a:t>tdvargo@sandia.gov</a:t>
             </a:r>
-            <a:endParaRPr lang="en-US" dirty="0"/>
           </a:p>
         </p:txBody>
       </p:sp>
@@ -18827,12 +18859,8 @@
           </a:lstStyle>
           <a:p>
             <a:r>
-              <a:rPr lang="en-US" dirty="0" smtClean="0"/>
-              <a:t>Binary </a:t>
-            </a:r>
-            <a:r>
-              <a:rPr lang="en-US" dirty="0"/>
-              <a:t>Palette</a:t>
+              <a:rPr lang="en-US" dirty="0"/>
+              <a:t>Binary Palette</a:t>
             </a:r>
           </a:p>
         </p:txBody>
@@ -19064,10 +19092,9 @@
           </a:lstStyle>
           <a:p>
             <a:r>
-              <a:rPr lang="en-US" dirty="0" smtClean="0"/>
+              <a:rPr lang="en-US" dirty="0"/>
               <a:t>Owner</a:t>
             </a:r>
-            <a:endParaRPr lang="en-US" dirty="0"/>
           </a:p>
           <a:p>
             <a:r>
@@ -19119,10 +19146,9 @@
           </a:lstStyle>
           <a:p>
             <a:r>
-              <a:rPr lang="en-US" dirty="0" smtClean="0"/>
+              <a:rPr lang="en-US" dirty="0"/>
               <a:t>Ravi Beniwal</a:t>
             </a:r>
-            <a:endParaRPr lang="en-US" dirty="0"/>
           </a:p>
         </p:txBody>
       </p:sp>
@@ -19283,14 +19309,9 @@
           <a:lstStyle/>
           <a:p>
             <a:r>
-              <a:rPr lang="en-US" dirty="0" smtClean="0"/>
-              <a:t>Old-school </a:t>
-            </a:r>
-            <a:r>
-              <a:rPr lang="en-US" dirty="0"/>
-              <a:t>debugging tools</a:t>
-            </a:r>
-            <a:endParaRPr lang="en-US" dirty="0"/>
+              <a:rPr lang="en-US" dirty="0"/>
+              <a:t>Tried &amp; True, Conventional Debugging Tools</a:t>
+            </a:r>
           </a:p>
         </p:txBody>
       </p:sp>
@@ -19304,27 +19325,22 @@
             <p:ph idx="1"/>
           </p:nvPr>
         </p:nvSpPr>
-        <p:spPr/>
+        <p:spPr>
+          <a:xfrm>
+            <a:off x="454026" y="1237900"/>
+            <a:ext cx="8229600" cy="3045342"/>
+          </a:xfrm>
+        </p:spPr>
         <p:txBody>
           <a:bodyPr/>
           <a:lstStyle/>
           <a:p>
-            <a:r>
-              <a:rPr lang="en-US" dirty="0" smtClean="0"/>
-              <a:t>Execution Highlighting</a:t>
-            </a:r>
-          </a:p>
-          <a:p>
-            <a:r>
-              <a:rPr lang="en-US" dirty="0" smtClean="0"/>
-              <a:t>Breakpoints</a:t>
-            </a:r>
-          </a:p>
-          <a:p>
-            <a:r>
-              <a:rPr lang="en-US" dirty="0" smtClean="0"/>
-              <a:t>Probes</a:t>
-            </a:r>
+            <a:pPr marL="0" indent="0">
+              <a:buNone/>
+            </a:pPr>
+            <a:endParaRPr lang="en-US" dirty="0"/>
+          </a:p>
+          <a:p>
             <a:endParaRPr lang="en-US" dirty="0"/>
           </a:p>
         </p:txBody>
@@ -19345,13 +19361,334 @@
           <a:lstStyle/>
           <a:p>
             <a:r>
-              <a:rPr lang="en-US" dirty="0" smtClean="0"/>
-              <a:t>Which still work very well, but with limitations</a:t>
-            </a:r>
-            <a:endParaRPr lang="en-US" dirty="0"/>
-          </a:p>
-        </p:txBody>
-      </p:sp>
+              <a:rPr lang="en-US" dirty="0"/>
+              <a:t>… which still work very well, but with limitations</a:t>
+            </a:r>
+          </a:p>
+        </p:txBody>
+      </p:sp>
+      <p:graphicFrame>
+        <p:nvGraphicFramePr>
+          <p:cNvPr id="5" name="Table 4"/>
+          <p:cNvGraphicFramePr>
+            <a:graphicFrameLocks noGrp="1"/>
+          </p:cNvGraphicFramePr>
+          <p:nvPr>
+            <p:extLst>
+              <p:ext uri="{D42A27DB-BD31-4B8C-83A1-F6EECF244321}">
+                <p14:modId xmlns:p14="http://schemas.microsoft.com/office/powerpoint/2010/main" val="1155002143"/>
+              </p:ext>
+            </p:extLst>
+          </p:nvPr>
+        </p:nvGraphicFramePr>
+        <p:xfrm>
+          <a:off x="623348" y="1194318"/>
+          <a:ext cx="7350925" cy="3148393"/>
+        </p:xfrm>
+        <a:graphic>
+          <a:graphicData uri="http://schemas.openxmlformats.org/drawingml/2006/table">
+            <a:tbl>
+              <a:tblPr firstRow="1" bandRow="1">
+                <a:tableStyleId>{5C22544A-7EE6-4342-B048-85BDC9FD1C3A}</a:tableStyleId>
+              </a:tblPr>
+              <a:tblGrid>
+                <a:gridCol w="2506980">
+                  <a:extLst>
+                    <a:ext uri="{9D8B030D-6E8A-4147-A177-3AD203B41FA5}">
+                      <a16:colId xmlns:a16="http://schemas.microsoft.com/office/drawing/2014/main" val="1279173352"/>
+                    </a:ext>
+                  </a:extLst>
+                </a:gridCol>
+                <a:gridCol w="2248853">
+                  <a:extLst>
+                    <a:ext uri="{9D8B030D-6E8A-4147-A177-3AD203B41FA5}">
+                      <a16:colId xmlns:a16="http://schemas.microsoft.com/office/drawing/2014/main" val="1096528273"/>
+                    </a:ext>
+                  </a:extLst>
+                </a:gridCol>
+                <a:gridCol w="2595092">
+                  <a:extLst>
+                    <a:ext uri="{9D8B030D-6E8A-4147-A177-3AD203B41FA5}">
+                      <a16:colId xmlns:a16="http://schemas.microsoft.com/office/drawing/2014/main" val="3341016758"/>
+                    </a:ext>
+                  </a:extLst>
+                </a:gridCol>
+              </a:tblGrid>
+              <a:tr h="429357">
+                <a:tc>
+                  <a:txBody>
+                    <a:bodyPr/>
+                    <a:lstStyle/>
+                    <a:p>
+                      <a:r>
+                        <a:rPr lang="en-US" dirty="0"/>
+                        <a:t>Built-in Debug Tool</a:t>
+                      </a:r>
+                    </a:p>
+                  </a:txBody>
+                  <a:tcPr/>
+                </a:tc>
+                <a:tc>
+                  <a:txBody>
+                    <a:bodyPr/>
+                    <a:lstStyle/>
+                    <a:p>
+                      <a:r>
+                        <a:rPr lang="en-US" dirty="0"/>
+                        <a:t>Pros</a:t>
+                      </a:r>
+                    </a:p>
+                  </a:txBody>
+                  <a:tcPr/>
+                </a:tc>
+                <a:tc>
+                  <a:txBody>
+                    <a:bodyPr/>
+                    <a:lstStyle/>
+                    <a:p>
+                      <a:r>
+                        <a:rPr lang="en-US" dirty="0"/>
+                        <a:t>Cons</a:t>
+                      </a:r>
+                    </a:p>
+                  </a:txBody>
+                  <a:tcPr/>
+                </a:tc>
+                <a:extLst>
+                  <a:ext uri="{0D108BD9-81ED-4DB2-BD59-A6C34878D82A}">
+                    <a16:rowId xmlns:a16="http://schemas.microsoft.com/office/drawing/2014/main" val="2020939110"/>
+                  </a:ext>
+                </a:extLst>
+              </a:tr>
+              <a:tr h="423475">
+                <a:tc>
+                  <a:txBody>
+                    <a:bodyPr/>
+                    <a:lstStyle/>
+                    <a:p>
+                      <a:pPr marL="0" marR="0" lvl="0" indent="0" algn="l" defTabSz="914400" rtl="0" eaLnBrk="1" fontAlgn="auto" latinLnBrk="0" hangingPunct="1">
+                        <a:lnSpc>
+                          <a:spcPct val="100000"/>
+                        </a:lnSpc>
+                        <a:spcBef>
+                          <a:spcPts val="0"/>
+                        </a:spcBef>
+                        <a:spcAft>
+                          <a:spcPts val="0"/>
+                        </a:spcAft>
+                        <a:buClrTx/>
+                        <a:buSzTx/>
+                        <a:buFontTx/>
+                        <a:buNone/>
+                        <a:tabLst/>
+                        <a:defRPr/>
+                      </a:pPr>
+                      <a:r>
+                        <a:rPr lang="en-US" dirty="0"/>
+                        <a:t>Execution Highlighting</a:t>
+                      </a:r>
+                    </a:p>
+                  </a:txBody>
+                  <a:tcPr/>
+                </a:tc>
+                <a:tc>
+                  <a:txBody>
+                    <a:bodyPr/>
+                    <a:lstStyle/>
+                    <a:p>
+                      <a:r>
+                        <a:rPr lang="en-US" dirty="0"/>
+                        <a:t>Visualizes data flow</a:t>
+                      </a:r>
+                    </a:p>
+                  </a:txBody>
+                  <a:tcPr/>
+                </a:tc>
+                <a:tc>
+                  <a:txBody>
+                    <a:bodyPr/>
+                    <a:lstStyle/>
+                    <a:p>
+                      <a:r>
+                        <a:rPr lang="en-US" dirty="0"/>
+                        <a:t>Slows execution speed</a:t>
+                      </a:r>
+                    </a:p>
+                  </a:txBody>
+                  <a:tcPr/>
+                </a:tc>
+                <a:extLst>
+                  <a:ext uri="{0D108BD9-81ED-4DB2-BD59-A6C34878D82A}">
+                    <a16:rowId xmlns:a16="http://schemas.microsoft.com/office/drawing/2014/main" val="3741890396"/>
+                  </a:ext>
+                </a:extLst>
+              </a:tr>
+              <a:tr h="741081">
+                <a:tc>
+                  <a:txBody>
+                    <a:bodyPr/>
+                    <a:lstStyle/>
+                    <a:p>
+                      <a:r>
+                        <a:rPr lang="en-US" dirty="0"/>
+                        <a:t>Breakpoints</a:t>
+                      </a:r>
+                    </a:p>
+                  </a:txBody>
+                  <a:tcPr/>
+                </a:tc>
+                <a:tc>
+                  <a:txBody>
+                    <a:bodyPr/>
+                    <a:lstStyle/>
+                    <a:p>
+                      <a:r>
+                        <a:rPr lang="en-US" dirty="0"/>
+                        <a:t>Pause execution at this exact point</a:t>
+                      </a:r>
+                    </a:p>
+                  </a:txBody>
+                  <a:tcPr/>
+                </a:tc>
+                <a:tc>
+                  <a:txBody>
+                    <a:bodyPr/>
+                    <a:lstStyle/>
+                    <a:p>
+                      <a:r>
+                        <a:rPr lang="en-US" dirty="0"/>
+                        <a:t>Persistent</a:t>
+                      </a:r>
+                    </a:p>
+                  </a:txBody>
+                  <a:tcPr/>
+                </a:tc>
+                <a:extLst>
+                  <a:ext uri="{0D108BD9-81ED-4DB2-BD59-A6C34878D82A}">
+                    <a16:rowId xmlns:a16="http://schemas.microsoft.com/office/drawing/2014/main" val="4172391331"/>
+                  </a:ext>
+                </a:extLst>
+              </a:tr>
+              <a:tr h="429357">
+                <a:tc>
+                  <a:txBody>
+                    <a:bodyPr/>
+                    <a:lstStyle/>
+                    <a:p>
+                      <a:r>
+                        <a:rPr lang="en-US" dirty="0"/>
+                        <a:t>Default Probes</a:t>
+                      </a:r>
+                    </a:p>
+                  </a:txBody>
+                  <a:tcPr/>
+                </a:tc>
+                <a:tc>
+                  <a:txBody>
+                    <a:bodyPr/>
+                    <a:lstStyle/>
+                    <a:p>
+                      <a:r>
+                        <a:rPr lang="en-US" dirty="0"/>
+                        <a:t>Peek at wire values</a:t>
+                      </a:r>
+                    </a:p>
+                  </a:txBody>
+                  <a:tcPr/>
+                </a:tc>
+                <a:tc>
+                  <a:txBody>
+                    <a:bodyPr/>
+                    <a:lstStyle/>
+                    <a:p>
+                      <a:pPr marL="0" marR="0" lvl="0" indent="0" algn="l" defTabSz="914400" rtl="0" eaLnBrk="1" fontAlgn="auto" latinLnBrk="0" hangingPunct="1">
+                        <a:lnSpc>
+                          <a:spcPct val="100000"/>
+                        </a:lnSpc>
+                        <a:spcBef>
+                          <a:spcPts val="0"/>
+                        </a:spcBef>
+                        <a:spcAft>
+                          <a:spcPts val="0"/>
+                        </a:spcAft>
+                        <a:buClrTx/>
+                        <a:buSzTx/>
+                        <a:buFontTx/>
+                        <a:buNone/>
+                        <a:tabLst/>
+                        <a:defRPr/>
+                      </a:pPr>
+                      <a:r>
+                        <a:rPr lang="en-US" b="1" dirty="0"/>
+                        <a:t>Difficult to place in clones</a:t>
+                      </a:r>
+                      <a:r>
+                        <a:rPr lang="en-US" dirty="0"/>
+                        <a:t>, Non-persistent</a:t>
+                      </a:r>
+                    </a:p>
+                    <a:p>
+                      <a:endParaRPr lang="en-US" dirty="0"/>
+                    </a:p>
+                  </a:txBody>
+                  <a:tcPr/>
+                </a:tc>
+                <a:extLst>
+                  <a:ext uri="{0D108BD9-81ED-4DB2-BD59-A6C34878D82A}">
+                    <a16:rowId xmlns:a16="http://schemas.microsoft.com/office/drawing/2014/main" val="2206996962"/>
+                  </a:ext>
+                </a:extLst>
+              </a:tr>
+              <a:tr h="429357">
+                <a:tc>
+                  <a:txBody>
+                    <a:bodyPr/>
+                    <a:lstStyle/>
+                    <a:p>
+                      <a:r>
+                        <a:rPr lang="en-US" dirty="0"/>
+                        <a:t>Custom Probes</a:t>
+                      </a:r>
+                    </a:p>
+                  </a:txBody>
+                  <a:tcPr/>
+                </a:tc>
+                <a:tc>
+                  <a:txBody>
+                    <a:bodyPr/>
+                    <a:lstStyle/>
+                    <a:p>
+                      <a:r>
+                        <a:rPr lang="en-US" dirty="0"/>
+                        <a:t>+ custom view and/or actions</a:t>
+                      </a:r>
+                    </a:p>
+                  </a:txBody>
+                  <a:tcPr/>
+                </a:tc>
+                <a:tc>
+                  <a:txBody>
+                    <a:bodyPr/>
+                    <a:lstStyle/>
+                    <a:p>
+                      <a:r>
+                        <a:rPr lang="en-US" dirty="0"/>
+                        <a:t>Per LV version</a:t>
+                      </a:r>
+                    </a:p>
+                  </a:txBody>
+                  <a:tcPr/>
+                </a:tc>
+                <a:extLst>
+                  <a:ext uri="{0D108BD9-81ED-4DB2-BD59-A6C34878D82A}">
+                    <a16:rowId xmlns:a16="http://schemas.microsoft.com/office/drawing/2014/main" val="3701902657"/>
+                  </a:ext>
+                </a:extLst>
+              </a:tr>
+            </a:tbl>
+          </a:graphicData>
+        </a:graphic>
+      </p:graphicFrame>
     </p:spTree>
     <p:extLst>
       <p:ext uri="{BB962C8B-B14F-4D97-AF65-F5344CB8AC3E}">
@@ -19410,10 +19747,9 @@
           <a:lstStyle/>
           <a:p>
             <a:r>
-              <a:rPr lang="en-US" dirty="0" smtClean="0"/>
+              <a:rPr lang="en-US" dirty="0"/>
               <a:t>Probes</a:t>
             </a:r>
-            <a:endParaRPr lang="en-US" dirty="0"/>
           </a:p>
         </p:txBody>
       </p:sp>
@@ -19644,97 +19980,96 @@
           </a:lstStyle>
           <a:p>
             <a:r>
-              <a:rPr lang="en-US" sz="2400" dirty="0" smtClean="0"/>
+              <a:rPr lang="en-US" sz="2400" dirty="0"/>
               <a:t>Review of Generic Probes</a:t>
             </a:r>
           </a:p>
           <a:p>
             <a:pPr lvl="1"/>
             <a:r>
-              <a:rPr lang="en-US" sz="2000" dirty="0" smtClean="0"/>
+              <a:rPr lang="en-US" sz="2000" dirty="0"/>
               <a:t>Retain Wire Values</a:t>
             </a:r>
           </a:p>
           <a:p>
             <a:r>
-              <a:rPr lang="en-US" sz="2400" b="1" dirty="0" smtClean="0"/>
+              <a:rPr lang="en-US" sz="2400" b="1" dirty="0"/>
               <a:t>Custom Probes</a:t>
             </a:r>
           </a:p>
           <a:p>
             <a:pPr lvl="1"/>
             <a:r>
-              <a:rPr lang="en-US" sz="2000" dirty="0" smtClean="0"/>
+              <a:rPr lang="en-US" sz="2000" dirty="0"/>
               <a:t>Custom Probes        Controls (look Mom, no code!)</a:t>
             </a:r>
           </a:p>
           <a:p>
             <a:pPr lvl="1"/>
             <a:r>
-              <a:rPr lang="en-US" sz="2000" dirty="0" smtClean="0"/>
+              <a:rPr lang="en-US" sz="2000" dirty="0"/>
               <a:t>Custom Probes        NI (native)</a:t>
             </a:r>
           </a:p>
           <a:p>
             <a:pPr lvl="2"/>
             <a:r>
-              <a:rPr lang="en-US" sz="1800" dirty="0" smtClean="0"/>
+              <a:rPr lang="en-US" sz="1800" dirty="0"/>
               <a:t>Conditional</a:t>
             </a:r>
           </a:p>
           <a:p>
             <a:pPr lvl="1"/>
             <a:r>
-              <a:rPr lang="en-US" sz="2000" dirty="0" smtClean="0"/>
+              <a:rPr lang="en-US" sz="2000" dirty="0"/>
               <a:t>Custom Probes        </a:t>
             </a:r>
             <a:r>
-              <a:rPr lang="en-US" sz="2000" dirty="0" err="1" smtClean="0"/>
+              <a:rPr lang="en-US" sz="2000" dirty="0" err="1"/>
               <a:t>Saphir</a:t>
             </a:r>
             <a:r>
-              <a:rPr lang="en-US" sz="2000" dirty="0" smtClean="0"/>
+              <a:rPr lang="en-US" sz="2000" dirty="0"/>
               <a:t> (3</a:t>
             </a:r>
             <a:r>
-              <a:rPr lang="en-US" sz="2000" baseline="30000" dirty="0" smtClean="0"/>
+              <a:rPr lang="en-US" sz="2000" baseline="30000" dirty="0"/>
               <a:t>rd</a:t>
             </a:r>
             <a:r>
-              <a:rPr lang="en-US" sz="2000" dirty="0" smtClean="0"/>
+              <a:rPr lang="en-US" sz="2000" dirty="0"/>
               <a:t> party, </a:t>
             </a:r>
             <a:r>
-              <a:rPr lang="en-US" sz="2000" dirty="0" err="1" smtClean="0"/>
+              <a:rPr lang="en-US" sz="2000" dirty="0" err="1"/>
               <a:t>ViBox</a:t>
             </a:r>
             <a:r>
-              <a:rPr lang="en-US" sz="2000" dirty="0" smtClean="0"/>
+              <a:rPr lang="en-US" sz="2000" dirty="0"/>
               <a:t> – Probes)</a:t>
             </a:r>
           </a:p>
           <a:p>
             <a:pPr lvl="1"/>
             <a:r>
-              <a:rPr lang="en-US" sz="2000" dirty="0" smtClean="0"/>
+              <a:rPr lang="en-US" sz="2000" dirty="0"/>
               <a:t>Custom Probes        New (roll your own)</a:t>
             </a:r>
           </a:p>
           <a:p>
             <a:pPr lvl="1"/>
             <a:r>
-              <a:rPr lang="en-US" sz="2000" dirty="0" smtClean="0"/>
+              <a:rPr lang="en-US" sz="2000" dirty="0"/>
               <a:t>Variant Probe (by Ton </a:t>
             </a:r>
             <a:r>
-              <a:rPr lang="en-US" sz="2000" dirty="0" err="1" smtClean="0"/>
+              <a:rPr lang="en-US" sz="2000" dirty="0" err="1"/>
               <a:t>Plomp</a:t>
             </a:r>
             <a:r>
-              <a:rPr lang="en-US" sz="2000" dirty="0" smtClean="0"/>
+              <a:rPr lang="en-US" sz="2000" dirty="0"/>
               <a:t>)</a:t>
             </a:r>
-            <a:endParaRPr lang="en-US" sz="2000" dirty="0"/>
           </a:p>
         </p:txBody>
       </p:sp>

</xml_diff>

<commit_message>
Updated some documentation More presentation content added
--HG--
branch : LVTNet
</commit_message>
<xml_diff>
--- a/Documentation/LVTM_NIWeek_2017.pptx
+++ b/Documentation/LVTM_NIWeek_2017.pptx
@@ -273,7 +273,7 @@
           <a:p>
             <a:fld id="{41DBDD7F-39F0-994B-B822-183990148EFC}" type="datetimeFigureOut">
               <a:rPr lang="en-US" smtClean="0"/>
-              <a:t>4/29/2017</a:t>
+              <a:t>01-May-2017</a:t>
             </a:fld>
             <a:endParaRPr lang="en-US"/>
           </a:p>
@@ -18978,7 +18978,7 @@
           <a:lstStyle/>
           <a:p>
             <a:r>
-              <a:rPr lang="en-US" dirty="0"/>
+              <a:rPr lang="en-US" b="1" dirty="0"/>
               <a:t>What to do when debugging becomes too complex ???</a:t>
             </a:r>
           </a:p>
@@ -19005,29 +19005,46 @@
           <a:lstStyle/>
           <a:p>
             <a:r>
-              <a:rPr lang="en-US" b="1" dirty="0"/>
-              <a:t>How to defeat these shortcomings, and many other debugging related challenges</a:t>
-            </a:r>
+              <a:rPr lang="en-US" dirty="0"/>
+              <a:t>How to defeat these shortcomings, and many other debugging related </a:t>
+            </a:r>
+            <a:r>
+              <a:rPr lang="en-US" dirty="0" smtClean="0"/>
+              <a:t>challenges …</a:t>
+            </a:r>
+            <a:endParaRPr lang="en-US" dirty="0"/>
           </a:p>
           <a:p>
             <a:pPr lvl="1"/>
             <a:r>
-              <a:rPr lang="en-US" dirty="0"/>
-              <a:t>have long been the topics of many user community discussions</a:t>
+              <a:rPr lang="en-US" dirty="0" smtClean="0"/>
+              <a:t>have </a:t>
+            </a:r>
+            <a:r>
+              <a:rPr lang="en-US" dirty="0"/>
+              <a:t>long been the topics of many user community discussions</a:t>
             </a:r>
           </a:p>
           <a:p>
             <a:pPr lvl="1"/>
             <a:r>
-              <a:rPr lang="en-US" dirty="0"/>
-              <a:t>several ad-hoc solutions and processes, although usually quite limited in scope, have been developed over the years by the user community</a:t>
+              <a:rPr lang="en-US" dirty="0" smtClean="0"/>
+              <a:t>several </a:t>
+            </a:r>
+            <a:r>
+              <a:rPr lang="en-US" dirty="0"/>
+              <a:t>ad-hoc solutions and processes, although usually quite limited in scope, have been developed over the years by the user community</a:t>
             </a:r>
           </a:p>
           <a:p>
             <a:pPr lvl="1"/>
             <a:r>
-              <a:rPr lang="en-US" dirty="0"/>
-              <a:t>but they lack the coherence of a unified tool</a:t>
+              <a:rPr lang="en-US" dirty="0" smtClean="0"/>
+              <a:t>but </a:t>
+            </a:r>
+            <a:r>
+              <a:rPr lang="en-US" dirty="0"/>
+              <a:t>they lack the coherence of a unified tool</a:t>
             </a:r>
           </a:p>
           <a:p>
@@ -19038,12 +19055,20 @@
           </a:p>
           <a:p>
             <a:r>
+              <a:rPr lang="en-US" sz="2800" b="1" dirty="0" smtClean="0">
+                <a:solidFill>
+                  <a:srgbClr val="0070C0"/>
+                </a:solidFill>
+              </a:rPr>
+              <a:t>Introducing </a:t>
+            </a:r>
+            <a:r>
               <a:rPr lang="en-US" sz="2800" b="1" dirty="0">
                 <a:solidFill>
                   <a:srgbClr val="0070C0"/>
                 </a:solidFill>
               </a:rPr>
-              <a:t>Enter the </a:t>
+              <a:t>the </a:t>
             </a:r>
           </a:p>
         </p:txBody>
@@ -19064,7 +19089,7 @@
         </p:blipFill>
         <p:spPr>
           <a:xfrm>
-            <a:off x="2463590" y="2950601"/>
+            <a:off x="3387616" y="2950601"/>
             <a:ext cx="3642486" cy="1761888"/>
           </a:xfrm>
           <a:prstGeom prst="rect">
@@ -22003,6 +22028,10 @@
                       <a:r>
                         <a:rPr lang="en-US" sz="1600" dirty="0"/>
                         <a:t>Pause execution at this exact point</a:t>
+                      </a:r>
+                      <a:r>
+                        <a:rPr lang="en-US" dirty="0"/>
+                        <a:t/>
                       </a:r>
                       <a:br>
                         <a:rPr lang="en-US" dirty="0"/>

</xml_diff>